<commit_message>
update files for writing a manuscript - class
</commit_message>
<xml_diff>
--- a/8. Writing a manuscript/what to include in a paper.pptx
+++ b/8. Writing a manuscript/what to include in a paper.pptx
@@ -5,21 +5,22 @@
     <p:sldMasterId id="2147483648" r:id="rId1"/>
   </p:sldMasterIdLst>
   <p:notesMasterIdLst>
-    <p:notesMasterId r:id="rId14"/>
+    <p:notesMasterId r:id="rId15"/>
   </p:notesMasterIdLst>
   <p:sldIdLst>
     <p:sldId id="265" r:id="rId2"/>
     <p:sldId id="274" r:id="rId3"/>
     <p:sldId id="273" r:id="rId4"/>
-    <p:sldId id="256" r:id="rId5"/>
-    <p:sldId id="270" r:id="rId6"/>
-    <p:sldId id="275" r:id="rId7"/>
-    <p:sldId id="276" r:id="rId8"/>
-    <p:sldId id="262" r:id="rId9"/>
-    <p:sldId id="269" r:id="rId10"/>
-    <p:sldId id="272" r:id="rId11"/>
-    <p:sldId id="261" r:id="rId12"/>
-    <p:sldId id="266" r:id="rId13"/>
+    <p:sldId id="277" r:id="rId5"/>
+    <p:sldId id="256" r:id="rId6"/>
+    <p:sldId id="270" r:id="rId7"/>
+    <p:sldId id="275" r:id="rId8"/>
+    <p:sldId id="276" r:id="rId9"/>
+    <p:sldId id="262" r:id="rId10"/>
+    <p:sldId id="269" r:id="rId11"/>
+    <p:sldId id="272" r:id="rId12"/>
+    <p:sldId id="261" r:id="rId13"/>
+    <p:sldId id="266" r:id="rId14"/>
   </p:sldIdLst>
   <p:sldSz cx="9144000" cy="6858000" type="screen4x3"/>
   <p:notesSz cx="6858000" cy="9144000"/>
@@ -220,7 +221,7 @@
             <a:fld id="{66F86660-A67E-4103-AD86-8CA849D0727F}" type="datetimeFigureOut">
               <a:rPr lang="en-US" smtClean="0"/>
               <a:pPr/>
-              <a:t>12/3/19</a:t>
+              <a:t>11/29/21</a:t>
             </a:fld>
             <a:endParaRPr lang="en-US"/>
           </a:p>
@@ -566,7 +567,7 @@
             <a:fld id="{DE40DC4C-6D25-49B8-AABF-1F35C338CAFF}" type="slidenum">
               <a:rPr lang="en-US" smtClean="0"/>
               <a:pPr/>
-              <a:t>4</a:t>
+              <a:t>5</a:t>
             </a:fld>
             <a:endParaRPr lang="en-US"/>
           </a:p>
@@ -669,7 +670,7 @@
             <a:fld id="{DE40DC4C-6D25-49B8-AABF-1F35C338CAFF}" type="slidenum">
               <a:rPr lang="en-US" smtClean="0"/>
               <a:pPr/>
-              <a:t>5</a:t>
+              <a:t>6</a:t>
             </a:fld>
             <a:endParaRPr lang="en-US"/>
           </a:p>
@@ -679,6 +680,91 @@
     <p:extLst>
       <p:ext uri="{BB962C8B-B14F-4D97-AF65-F5344CB8AC3E}">
         <p14:creationId xmlns:p14="http://schemas.microsoft.com/office/powerpoint/2010/main" val="496963264"/>
+      </p:ext>
+    </p:extLst>
+  </p:cSld>
+  <p:clrMapOvr>
+    <a:masterClrMapping/>
+  </p:clrMapOvr>
+</p:notes>
+</file>
+
+<file path=ppt/notesSlides/notesSlide3.xml><?xml version="1.0" encoding="utf-8"?>
+<p:notes xmlns:a="http://schemas.openxmlformats.org/drawingml/2006/main" xmlns:r="http://schemas.openxmlformats.org/officeDocument/2006/relationships" xmlns:p="http://schemas.openxmlformats.org/presentationml/2006/main">
+  <p:cSld>
+    <p:spTree>
+      <p:nvGrpSpPr>
+        <p:cNvPr id="1" name=""/>
+        <p:cNvGrpSpPr/>
+        <p:nvPr/>
+      </p:nvGrpSpPr>
+      <p:grpSpPr>
+        <a:xfrm>
+          <a:off x="0" y="0"/>
+          <a:ext cx="0" cy="0"/>
+          <a:chOff x="0" y="0"/>
+          <a:chExt cx="0" cy="0"/>
+        </a:xfrm>
+      </p:grpSpPr>
+      <p:sp>
+        <p:nvSpPr>
+          <p:cNvPr id="2" name="Slide Image Placeholder 1"/>
+          <p:cNvSpPr>
+            <a:spLocks noGrp="1" noRot="1" noChangeAspect="1"/>
+          </p:cNvSpPr>
+          <p:nvPr>
+            <p:ph type="sldImg"/>
+          </p:nvPr>
+        </p:nvSpPr>
+        <p:spPr/>
+      </p:sp>
+      <p:sp>
+        <p:nvSpPr>
+          <p:cNvPr id="3" name="Notes Placeholder 2"/>
+          <p:cNvSpPr>
+            <a:spLocks noGrp="1"/>
+          </p:cNvSpPr>
+          <p:nvPr>
+            <p:ph type="body" idx="1"/>
+          </p:nvPr>
+        </p:nvSpPr>
+        <p:spPr/>
+        <p:txBody>
+          <a:bodyPr/>
+          <a:lstStyle/>
+          <a:p>
+            <a:endParaRPr lang="en-US" dirty="0"/>
+          </a:p>
+        </p:txBody>
+      </p:sp>
+      <p:sp>
+        <p:nvSpPr>
+          <p:cNvPr id="4" name="Slide Number Placeholder 3"/>
+          <p:cNvSpPr>
+            <a:spLocks noGrp="1"/>
+          </p:cNvSpPr>
+          <p:nvPr>
+            <p:ph type="sldNum" sz="quarter" idx="5"/>
+          </p:nvPr>
+        </p:nvSpPr>
+        <p:spPr/>
+        <p:txBody>
+          <a:bodyPr/>
+          <a:lstStyle/>
+          <a:p>
+            <a:fld id="{DE40DC4C-6D25-49B8-AABF-1F35C338CAFF}" type="slidenum">
+              <a:rPr lang="en-US" smtClean="0"/>
+              <a:pPr/>
+              <a:t>10</a:t>
+            </a:fld>
+            <a:endParaRPr lang="en-US"/>
+          </a:p>
+        </p:txBody>
+      </p:sp>
+    </p:spTree>
+    <p:extLst>
+      <p:ext uri="{BB962C8B-B14F-4D97-AF65-F5344CB8AC3E}">
+        <p14:creationId xmlns:p14="http://schemas.microsoft.com/office/powerpoint/2010/main" val="1537950285"/>
       </p:ext>
     </p:extLst>
   </p:cSld>
@@ -868,7 +954,7 @@
             <a:fld id="{3ED7F6E3-333F-471C-B26F-404B9E4304DE}" type="datetimeFigureOut">
               <a:rPr lang="en-US" smtClean="0"/>
               <a:pPr/>
-              <a:t>12/3/19</a:t>
+              <a:t>11/29/21</a:t>
             </a:fld>
             <a:endParaRPr lang="en-US"/>
           </a:p>
@@ -1033,7 +1119,7 @@
             <a:fld id="{3ED7F6E3-333F-471C-B26F-404B9E4304DE}" type="datetimeFigureOut">
               <a:rPr lang="en-US" smtClean="0"/>
               <a:pPr/>
-              <a:t>12/3/19</a:t>
+              <a:t>11/29/21</a:t>
             </a:fld>
             <a:endParaRPr lang="en-US"/>
           </a:p>
@@ -1208,7 +1294,7 @@
             <a:fld id="{3ED7F6E3-333F-471C-B26F-404B9E4304DE}" type="datetimeFigureOut">
               <a:rPr lang="en-US" smtClean="0"/>
               <a:pPr/>
-              <a:t>12/3/19</a:t>
+              <a:t>11/29/21</a:t>
             </a:fld>
             <a:endParaRPr lang="en-US"/>
           </a:p>
@@ -1373,7 +1459,7 @@
             <a:fld id="{3ED7F6E3-333F-471C-B26F-404B9E4304DE}" type="datetimeFigureOut">
               <a:rPr lang="en-US" smtClean="0"/>
               <a:pPr/>
-              <a:t>12/3/19</a:t>
+              <a:t>11/29/21</a:t>
             </a:fld>
             <a:endParaRPr lang="en-US"/>
           </a:p>
@@ -1615,7 +1701,7 @@
             <a:fld id="{3ED7F6E3-333F-471C-B26F-404B9E4304DE}" type="datetimeFigureOut">
               <a:rPr lang="en-US" smtClean="0"/>
               <a:pPr/>
-              <a:t>12/3/19</a:t>
+              <a:t>11/29/21</a:t>
             </a:fld>
             <a:endParaRPr lang="en-US"/>
           </a:p>
@@ -1897,7 +1983,7 @@
             <a:fld id="{3ED7F6E3-333F-471C-B26F-404B9E4304DE}" type="datetimeFigureOut">
               <a:rPr lang="en-US" smtClean="0"/>
               <a:pPr/>
-              <a:t>12/3/19</a:t>
+              <a:t>11/29/21</a:t>
             </a:fld>
             <a:endParaRPr lang="en-US"/>
           </a:p>
@@ -2313,7 +2399,7 @@
             <a:fld id="{3ED7F6E3-333F-471C-B26F-404B9E4304DE}" type="datetimeFigureOut">
               <a:rPr lang="en-US" smtClean="0"/>
               <a:pPr/>
-              <a:t>12/3/19</a:t>
+              <a:t>11/29/21</a:t>
             </a:fld>
             <a:endParaRPr lang="en-US"/>
           </a:p>
@@ -2427,7 +2513,7 @@
             <a:fld id="{3ED7F6E3-333F-471C-B26F-404B9E4304DE}" type="datetimeFigureOut">
               <a:rPr lang="en-US" smtClean="0"/>
               <a:pPr/>
-              <a:t>12/3/19</a:t>
+              <a:t>11/29/21</a:t>
             </a:fld>
             <a:endParaRPr lang="en-US"/>
           </a:p>
@@ -2519,7 +2605,7 @@
             <a:fld id="{3ED7F6E3-333F-471C-B26F-404B9E4304DE}" type="datetimeFigureOut">
               <a:rPr lang="en-US" smtClean="0"/>
               <a:pPr/>
-              <a:t>12/3/19</a:t>
+              <a:t>11/29/21</a:t>
             </a:fld>
             <a:endParaRPr lang="en-US"/>
           </a:p>
@@ -2791,7 +2877,7 @@
             <a:fld id="{3ED7F6E3-333F-471C-B26F-404B9E4304DE}" type="datetimeFigureOut">
               <a:rPr lang="en-US" smtClean="0"/>
               <a:pPr/>
-              <a:t>12/3/19</a:t>
+              <a:t>11/29/21</a:t>
             </a:fld>
             <a:endParaRPr lang="en-US"/>
           </a:p>
@@ -3040,7 +3126,7 @@
             <a:fld id="{3ED7F6E3-333F-471C-B26F-404B9E4304DE}" type="datetimeFigureOut">
               <a:rPr lang="en-US" smtClean="0"/>
               <a:pPr/>
-              <a:t>12/3/19</a:t>
+              <a:t>11/29/21</a:t>
             </a:fld>
             <a:endParaRPr lang="en-US"/>
           </a:p>
@@ -3248,7 +3334,7 @@
             <a:fld id="{3ED7F6E3-333F-471C-B26F-404B9E4304DE}" type="datetimeFigureOut">
               <a:rPr lang="en-US" smtClean="0"/>
               <a:pPr/>
-              <a:t>12/3/19</a:t>
+              <a:t>11/29/21</a:t>
             </a:fld>
             <a:endParaRPr lang="en-US"/>
           </a:p>
@@ -3660,7 +3746,7 @@
           <a:p>
             <a:r>
               <a:rPr lang="en-US" dirty="0"/>
-              <a:t>December 3, 2019</a:t>
+              <a:t>November 29, 2021</a:t>
             </a:r>
           </a:p>
         </p:txBody>
@@ -3692,28 +3778,6 @@
       </p:grpSpPr>
       <p:sp>
         <p:nvSpPr>
-          <p:cNvPr id="2" name="Title 1"/>
-          <p:cNvSpPr>
-            <a:spLocks noGrp="1"/>
-          </p:cNvSpPr>
-          <p:nvPr>
-            <p:ph type="title"/>
-          </p:nvPr>
-        </p:nvSpPr>
-        <p:spPr/>
-        <p:txBody>
-          <a:bodyPr/>
-          <a:lstStyle/>
-          <a:p>
-            <a:r>
-              <a:rPr lang="en-US" dirty="0"/>
-              <a:t>Results – in text, table, or figures</a:t>
-            </a:r>
-          </a:p>
-        </p:txBody>
-      </p:sp>
-      <p:sp>
-        <p:nvSpPr>
           <p:cNvPr id="3" name="Content Placeholder 2"/>
           <p:cNvSpPr>
             <a:spLocks noGrp="1"/>
@@ -3731,46 +3795,73 @@
           <a:p>
             <a:r>
               <a:rPr lang="en-US" dirty="0"/>
-              <a:t>For LM report </a:t>
-            </a:r>
-            <a:r>
-              <a:rPr lang="en-US" b="1" dirty="0"/>
-              <a:t>all</a:t>
-            </a:r>
-            <a:r>
-              <a:rPr lang="en-US" dirty="0"/>
-              <a:t> F and p values if even non-significant.</a:t>
-            </a:r>
-          </a:p>
-          <a:p>
-            <a:pPr lvl="1"/>
-            <a:r>
-              <a:rPr lang="en-US" b="1" dirty="0"/>
-              <a:t>Text: </a:t>
-            </a:r>
-            <a:r>
-              <a:rPr lang="en-US" dirty="0"/>
-              <a:t>(Test Name, F = all values , p = all values)</a:t>
-            </a:r>
-          </a:p>
-          <a:p>
-            <a:r>
-              <a:rPr lang="en-US" dirty="0"/>
-              <a:t>If use Likelihood Ratio Test to test whether something is significant, report p-value (chi symbol with </a:t>
-            </a:r>
-            <a:r>
-              <a:rPr lang="en-US" dirty="0" err="1"/>
-              <a:t>df</a:t>
-            </a:r>
-            <a:r>
-              <a:rPr lang="en-US" dirty="0"/>
-              <a:t>, LRT, and p-value)</a:t>
-            </a:r>
-          </a:p>
-          <a:p>
-            <a:r>
-              <a:rPr lang="en-US" dirty="0"/>
-              <a:t>P values are more informative than symbols such as * and **</a:t>
+              <a:t>Describe relationships between variables in best fitting model (e.g. as x increased, y decreased);  Should only do this with significant variables. </a:t>
+            </a:r>
+          </a:p>
+          <a:p>
+            <a:r>
+              <a:rPr lang="en-US" dirty="0"/>
+              <a:t>Present estimated mean (coefficient from model) and standard error from optimal model</a:t>
+            </a:r>
+          </a:p>
+        </p:txBody>
+      </p:sp>
+      <p:sp>
+        <p:nvSpPr>
+          <p:cNvPr id="4" name="Title 3"/>
+          <p:cNvSpPr txBox="1">
+            <a:spLocks/>
+          </p:cNvSpPr>
+          <p:nvPr/>
+        </p:nvSpPr>
+        <p:spPr>
+          <a:xfrm>
+            <a:off x="457200" y="304800"/>
+            <a:ext cx="8229600" cy="1143000"/>
+          </a:xfrm>
+          <a:prstGeom prst="rect">
+            <a:avLst/>
+          </a:prstGeom>
+        </p:spPr>
+        <p:txBody>
+          <a:bodyPr vert="horz" lIns="91440" tIns="45720" rIns="91440" bIns="45720" rtlCol="0" anchor="ctr">
+            <a:normAutofit/>
+          </a:bodyPr>
+          <a:lstStyle/>
+          <a:p>
+            <a:pPr marL="0" marR="0" lvl="0" indent="0" algn="ctr" defTabSz="914400" rtl="0" eaLnBrk="1" fontAlgn="auto" latinLnBrk="0" hangingPunct="1">
+              <a:lnSpc>
+                <a:spcPct val="100000"/>
+              </a:lnSpc>
+              <a:spcBef>
+                <a:spcPct val="0"/>
+              </a:spcBef>
+              <a:spcAft>
+                <a:spcPts val="0"/>
+              </a:spcAft>
+              <a:buClrTx/>
+              <a:buSzTx/>
+              <a:buFontTx/>
+              <a:buNone/>
+              <a:tabLst/>
+              <a:defRPr/>
+            </a:pPr>
+            <a:r>
+              <a:rPr kumimoji="0" lang="en-US" sz="4400" b="0" i="0" u="none" strike="noStrike" kern="1200" cap="none" spc="0" normalizeH="0" baseline="0" noProof="0" dirty="0">
+                <a:ln>
+                  <a:noFill/>
+                </a:ln>
+                <a:solidFill>
+                  <a:schemeClr val="tx1"/>
+                </a:solidFill>
+                <a:effectLst/>
+                <a:uLnTx/>
+                <a:uFillTx/>
+                <a:latin typeface="+mj-lt"/>
+                <a:ea typeface="+mj-ea"/>
+                <a:cs typeface="+mj-cs"/>
+              </a:rPr>
+              <a:t>Results - in text</a:t>
             </a:r>
           </a:p>
         </p:txBody>
@@ -3817,14 +3908,14 @@
           <a:p>
             <a:r>
               <a:rPr lang="en-US" dirty="0"/>
-              <a:t>Results- in table</a:t>
-            </a:r>
-          </a:p>
-        </p:txBody>
-      </p:sp>
-      <p:sp>
-        <p:nvSpPr>
-          <p:cNvPr id="6" name="Content Placeholder 5"/>
+              <a:t>Results – in text, table, or figures</a:t>
+            </a:r>
+          </a:p>
+        </p:txBody>
+      </p:sp>
+      <p:sp>
+        <p:nvSpPr>
+          <p:cNvPr id="3" name="Content Placeholder 2"/>
           <p:cNvSpPr>
             <a:spLocks noGrp="1"/>
           </p:cNvSpPr>
@@ -3832,12 +3923,7 @@
             <p:ph idx="1"/>
           </p:nvPr>
         </p:nvSpPr>
-        <p:spPr>
-          <a:xfrm>
-            <a:off x="457200" y="1371600"/>
-            <a:ext cx="8229600" cy="5105400"/>
-          </a:xfrm>
-        </p:spPr>
+        <p:spPr/>
         <p:txBody>
           <a:bodyPr>
             <a:normAutofit/>
@@ -3846,41 +3932,46 @@
           <a:p>
             <a:r>
               <a:rPr lang="en-US" dirty="0"/>
-              <a:t>For single model: </a:t>
+              <a:t>For LM report </a:t>
+            </a:r>
+            <a:r>
+              <a:rPr lang="en-US" b="1" dirty="0"/>
+              <a:t>all</a:t>
+            </a:r>
+            <a:r>
+              <a:rPr lang="en-US" dirty="0"/>
+              <a:t> F and p values if even non-significant.</a:t>
             </a:r>
           </a:p>
           <a:p>
             <a:pPr lvl="1"/>
             <a:r>
-              <a:rPr lang="en-US" dirty="0"/>
-              <a:t>Present estimated parameters, standard errors, degrees of freedom (if available) </a:t>
-            </a:r>
-          </a:p>
-          <a:p>
-            <a:pPr lvl="2"/>
-            <a:r>
-              <a:rPr lang="en-US" dirty="0"/>
-              <a:t>May be difficult to get degrees of freedom from mixed effects models</a:t>
-            </a:r>
-          </a:p>
-          <a:p>
-            <a:r>
-              <a:rPr lang="en-US" dirty="0"/>
-              <a:t>For model selection: </a:t>
-            </a:r>
-          </a:p>
-          <a:p>
-            <a:pPr lvl="1"/>
-            <a:r>
-              <a:rPr lang="en-US" dirty="0"/>
-              <a:t>Table showing model rankings with log likelihoods, AIC’s, maybe delta AIC’s.  </a:t>
-            </a:r>
-          </a:p>
-          <a:p>
-            <a:pPr lvl="1"/>
-            <a:r>
-              <a:rPr lang="en-US" dirty="0"/>
-              <a:t>Whether or not to present intermediate models is a matter of preference, space</a:t>
+              <a:rPr lang="en-US" b="1" dirty="0"/>
+              <a:t>Text: </a:t>
+            </a:r>
+            <a:r>
+              <a:rPr lang="en-US" dirty="0"/>
+              <a:t>(Test Name, F = all values , p = all values)</a:t>
+            </a:r>
+          </a:p>
+          <a:p>
+            <a:r>
+              <a:rPr lang="en-US" dirty="0"/>
+              <a:t>If use Likelihood Ratio Test to test whether something is significant, report p-value (chi symbol with </a:t>
+            </a:r>
+            <a:r>
+              <a:rPr lang="en-US" dirty="0" err="1"/>
+              <a:t>df</a:t>
+            </a:r>
+            <a:r>
+              <a:rPr lang="en-US" dirty="0"/>
+              <a:t>, LRT, and p-value)</a:t>
+            </a:r>
+          </a:p>
+          <a:p>
+            <a:r>
+              <a:rPr lang="en-US" dirty="0"/>
+              <a:t>P values are more informative than symbols such as * and **</a:t>
             </a:r>
           </a:p>
         </p:txBody>
@@ -3894,6 +3985,116 @@
 </file>
 
 <file path=ppt/slides/slide12.xml><?xml version="1.0" encoding="utf-8"?>
+<p:sld xmlns:a="http://schemas.openxmlformats.org/drawingml/2006/main" xmlns:r="http://schemas.openxmlformats.org/officeDocument/2006/relationships" xmlns:p="http://schemas.openxmlformats.org/presentationml/2006/main">
+  <p:cSld>
+    <p:spTree>
+      <p:nvGrpSpPr>
+        <p:cNvPr id="1" name=""/>
+        <p:cNvGrpSpPr/>
+        <p:nvPr/>
+      </p:nvGrpSpPr>
+      <p:grpSpPr>
+        <a:xfrm>
+          <a:off x="0" y="0"/>
+          <a:ext cx="0" cy="0"/>
+          <a:chOff x="0" y="0"/>
+          <a:chExt cx="0" cy="0"/>
+        </a:xfrm>
+      </p:grpSpPr>
+      <p:sp>
+        <p:nvSpPr>
+          <p:cNvPr id="2" name="Title 1"/>
+          <p:cNvSpPr>
+            <a:spLocks noGrp="1"/>
+          </p:cNvSpPr>
+          <p:nvPr>
+            <p:ph type="title"/>
+          </p:nvPr>
+        </p:nvSpPr>
+        <p:spPr/>
+        <p:txBody>
+          <a:bodyPr/>
+          <a:lstStyle/>
+          <a:p>
+            <a:r>
+              <a:rPr lang="en-US" dirty="0"/>
+              <a:t>Results- in table</a:t>
+            </a:r>
+          </a:p>
+        </p:txBody>
+      </p:sp>
+      <p:sp>
+        <p:nvSpPr>
+          <p:cNvPr id="6" name="Content Placeholder 5"/>
+          <p:cNvSpPr>
+            <a:spLocks noGrp="1"/>
+          </p:cNvSpPr>
+          <p:nvPr>
+            <p:ph idx="1"/>
+          </p:nvPr>
+        </p:nvSpPr>
+        <p:spPr>
+          <a:xfrm>
+            <a:off x="457200" y="1371600"/>
+            <a:ext cx="8229600" cy="5105400"/>
+          </a:xfrm>
+        </p:spPr>
+        <p:txBody>
+          <a:bodyPr>
+            <a:normAutofit/>
+          </a:bodyPr>
+          <a:lstStyle/>
+          <a:p>
+            <a:r>
+              <a:rPr lang="en-US" dirty="0"/>
+              <a:t>For single model: </a:t>
+            </a:r>
+          </a:p>
+          <a:p>
+            <a:pPr lvl="1"/>
+            <a:r>
+              <a:rPr lang="en-US" dirty="0"/>
+              <a:t>Present estimated parameters, standard errors, degrees of freedom (if available) </a:t>
+            </a:r>
+          </a:p>
+          <a:p>
+            <a:pPr lvl="2"/>
+            <a:r>
+              <a:rPr lang="en-US" dirty="0"/>
+              <a:t>May be difficult to get degrees of freedom from mixed effects models</a:t>
+            </a:r>
+          </a:p>
+          <a:p>
+            <a:r>
+              <a:rPr lang="en-US" dirty="0"/>
+              <a:t>For model selection: </a:t>
+            </a:r>
+          </a:p>
+          <a:p>
+            <a:pPr lvl="1"/>
+            <a:r>
+              <a:rPr lang="en-US" dirty="0"/>
+              <a:t>Table showing model rankings with log likelihoods, AIC’s, maybe delta AIC’s.  </a:t>
+            </a:r>
+          </a:p>
+          <a:p>
+            <a:pPr lvl="1"/>
+            <a:r>
+              <a:rPr lang="en-US" dirty="0"/>
+              <a:t>Whether or not to present intermediate models is a matter of preference, space</a:t>
+            </a:r>
+          </a:p>
+        </p:txBody>
+      </p:sp>
+    </p:spTree>
+  </p:cSld>
+  <p:clrMapOvr>
+    <a:masterClrMapping/>
+  </p:clrMapOvr>
+</p:sld>
+</file>
+
+<file path=ppt/slides/slide13.xml><?xml version="1.0" encoding="utf-8"?>
 <p:sld xmlns:a="http://schemas.openxmlformats.org/drawingml/2006/main" xmlns:r="http://schemas.openxmlformats.org/officeDocument/2006/relationships" xmlns:p="http://schemas.openxmlformats.org/presentationml/2006/main">
   <p:cSld>
     <p:spTree>
@@ -4067,17 +4268,47 @@
             </a:pPr>
             <a:r>
               <a:rPr lang="en-US" dirty="0"/>
-              <a:t>Find where they report statistical approach in the methods. </a:t>
-            </a:r>
-          </a:p>
-          <a:p>
-            <a:pPr marL="571500" indent="-514350">
+              <a:t>Evaluate, using the checklist: </a:t>
+            </a:r>
+          </a:p>
+          <a:p>
+            <a:pPr marL="971550" lvl="1" indent="-514350">
               <a:buFont typeface="+mj-lt"/>
               <a:buAutoNum type="arabicPeriod"/>
             </a:pPr>
             <a:r>
               <a:rPr lang="en-US" dirty="0"/>
-              <a:t>Find any tables with statistical results (may need to go online for supplemental info)</a:t>
+              <a:t>statistical approach in the methods</a:t>
+            </a:r>
+          </a:p>
+          <a:p>
+            <a:pPr marL="971550" lvl="1" indent="-514350">
+              <a:buFont typeface="+mj-lt"/>
+              <a:buAutoNum type="arabicPeriod"/>
+            </a:pPr>
+            <a:r>
+              <a:rPr lang="en-US" dirty="0"/>
+              <a:t>statistical results</a:t>
+            </a:r>
+          </a:p>
+          <a:p>
+            <a:pPr marL="971550" lvl="1" indent="-514350">
+              <a:buFont typeface="+mj-lt"/>
+              <a:buAutoNum type="arabicPeriod"/>
+            </a:pPr>
+            <a:r>
+              <a:rPr lang="en-US" dirty="0"/>
+              <a:t>tables with statistical results (may need to go online for supplemental info)</a:t>
+            </a:r>
+          </a:p>
+          <a:p>
+            <a:pPr marL="971550" lvl="1" indent="-514350">
+              <a:buFont typeface="+mj-lt"/>
+              <a:buAutoNum type="arabicPeriod"/>
+            </a:pPr>
+            <a:r>
+              <a:rPr lang="en-US" dirty="0"/>
+              <a:t>Figures representing results</a:t>
             </a:r>
           </a:p>
         </p:txBody>
@@ -4169,7 +4400,7 @@
         </p:spPr>
         <p:txBody>
           <a:bodyPr>
-            <a:normAutofit fontScale="70000" lnSpcReduction="20000"/>
+            <a:normAutofit/>
           </a:bodyPr>
           <a:lstStyle/>
           <a:p>
@@ -4188,61 +4419,6 @@
             <a:r>
               <a:rPr lang="en-US" dirty="0"/>
               <a:t>The order of questions addressed should match the introduction and results. </a:t>
-            </a:r>
-          </a:p>
-          <a:p>
-            <a:r>
-              <a:rPr lang="en-US" dirty="0"/>
-              <a:t>Must include: </a:t>
-            </a:r>
-          </a:p>
-          <a:p>
-            <a:pPr lvl="1"/>
-            <a:r>
-              <a:rPr lang="en-US" dirty="0"/>
-              <a:t>Which hypothesis you are testing with a given analysis</a:t>
-            </a:r>
-          </a:p>
-          <a:p>
-            <a:pPr lvl="1"/>
-            <a:r>
-              <a:rPr lang="en-US" dirty="0"/>
-              <a:t>Name &amp; citation of statistical software and any packages used for analysis or graphing. </a:t>
-            </a:r>
-          </a:p>
-          <a:p>
-            <a:pPr lvl="1"/>
-            <a:r>
-              <a:rPr lang="en-US" dirty="0"/>
-              <a:t>How data were summarized (mean, percent, etc.) and what you are using for measures of variability (e.g. SD, SE, 95% CI), if relevant</a:t>
-            </a:r>
-          </a:p>
-          <a:p>
-            <a:pPr lvl="1"/>
-            <a:r>
-              <a:rPr lang="en-US" dirty="0"/>
-              <a:t>Statistical tests, with associated data transformations and significance level, if relevant</a:t>
-            </a:r>
-          </a:p>
-          <a:p>
-            <a:pPr lvl="1"/>
-            <a:r>
-              <a:rPr lang="en-US" dirty="0"/>
-              <a:t>Assessment of model fit</a:t>
-            </a:r>
-          </a:p>
-          <a:p>
-            <a:pPr lvl="1"/>
-            <a:r>
-              <a:rPr lang="en-US" dirty="0"/>
-              <a:t>Method of inference (e.g. p-values from full model or reduced model, post-hoc tests, likelihood ratio test, model selection via AIC)</a:t>
-            </a:r>
-          </a:p>
-          <a:p>
-            <a:pPr lvl="1"/>
-            <a:r>
-              <a:rPr lang="en-US" dirty="0"/>
-              <a:t>Explanation of any aberrations from standard process (e.g. how you dealt with outliers, missing data, correlated predictors, etc.)</a:t>
             </a:r>
           </a:p>
         </p:txBody>
@@ -4314,398 +4490,6 @@
                       </p:childTnLst>
                     </p:cTn>
                   </p:par>
-                  <p:par>
-                    <p:cTn id="7" fill="hold">
-                      <p:stCondLst>
-                        <p:cond delay="indefinite"/>
-                      </p:stCondLst>
-                      <p:childTnLst>
-                        <p:par>
-                          <p:cTn id="8" fill="hold">
-                            <p:stCondLst>
-                              <p:cond delay="0"/>
-                            </p:stCondLst>
-                            <p:childTnLst>
-                              <p:par>
-                                <p:cTn id="9" presetID="1" presetClass="entr" presetSubtype="0" fill="hold" nodeType="clickEffect">
-                                  <p:stCondLst>
-                                    <p:cond delay="0"/>
-                                  </p:stCondLst>
-                                  <p:childTnLst>
-                                    <p:set>
-                                      <p:cBhvr>
-                                        <p:cTn id="10" dur="1" fill="hold">
-                                          <p:stCondLst>
-                                            <p:cond delay="0"/>
-                                          </p:stCondLst>
-                                        </p:cTn>
-                                        <p:tgtEl>
-                                          <p:spTgt spid="3">
-                                            <p:txEl>
-                                              <p:pRg st="3" end="3"/>
-                                            </p:txEl>
-                                          </p:spTgt>
-                                        </p:tgtEl>
-                                        <p:attrNameLst>
-                                          <p:attrName>style.visibility</p:attrName>
-                                        </p:attrNameLst>
-                                      </p:cBhvr>
-                                      <p:to>
-                                        <p:strVal val="visible"/>
-                                      </p:to>
-                                    </p:set>
-                                  </p:childTnLst>
-                                </p:cTn>
-                              </p:par>
-                            </p:childTnLst>
-                          </p:cTn>
-                        </p:par>
-                      </p:childTnLst>
-                    </p:cTn>
-                  </p:par>
-                  <p:par>
-                    <p:cTn id="11" fill="hold">
-                      <p:stCondLst>
-                        <p:cond delay="indefinite"/>
-                      </p:stCondLst>
-                      <p:childTnLst>
-                        <p:par>
-                          <p:cTn id="12" fill="hold">
-                            <p:stCondLst>
-                              <p:cond delay="0"/>
-                            </p:stCondLst>
-                            <p:childTnLst>
-                              <p:par>
-                                <p:cTn id="13" presetID="1" presetClass="entr" presetSubtype="0" fill="hold" nodeType="clickEffect">
-                                  <p:stCondLst>
-                                    <p:cond delay="0"/>
-                                  </p:stCondLst>
-                                  <p:childTnLst>
-                                    <p:set>
-                                      <p:cBhvr>
-                                        <p:cTn id="14" dur="1" fill="hold">
-                                          <p:stCondLst>
-                                            <p:cond delay="0"/>
-                                          </p:stCondLst>
-                                        </p:cTn>
-                                        <p:tgtEl>
-                                          <p:spTgt spid="3">
-                                            <p:txEl>
-                                              <p:pRg st="4" end="4"/>
-                                            </p:txEl>
-                                          </p:spTgt>
-                                        </p:tgtEl>
-                                        <p:attrNameLst>
-                                          <p:attrName>style.visibility</p:attrName>
-                                        </p:attrNameLst>
-                                      </p:cBhvr>
-                                      <p:to>
-                                        <p:strVal val="visible"/>
-                                      </p:to>
-                                    </p:set>
-                                  </p:childTnLst>
-                                </p:cTn>
-                              </p:par>
-                            </p:childTnLst>
-                          </p:cTn>
-                        </p:par>
-                      </p:childTnLst>
-                    </p:cTn>
-                  </p:par>
-                  <p:par>
-                    <p:cTn id="15" fill="hold">
-                      <p:stCondLst>
-                        <p:cond delay="indefinite"/>
-                      </p:stCondLst>
-                      <p:childTnLst>
-                        <p:par>
-                          <p:cTn id="16" fill="hold">
-                            <p:stCondLst>
-                              <p:cond delay="0"/>
-                            </p:stCondLst>
-                            <p:childTnLst>
-                              <p:par>
-                                <p:cTn id="17" presetID="1" presetClass="entr" presetSubtype="0" fill="hold" nodeType="clickEffect">
-                                  <p:stCondLst>
-                                    <p:cond delay="0"/>
-                                  </p:stCondLst>
-                                  <p:childTnLst>
-                                    <p:set>
-                                      <p:cBhvr>
-                                        <p:cTn id="18" dur="1" fill="hold">
-                                          <p:stCondLst>
-                                            <p:cond delay="0"/>
-                                          </p:stCondLst>
-                                        </p:cTn>
-                                        <p:tgtEl>
-                                          <p:spTgt spid="3">
-                                            <p:txEl>
-                                              <p:pRg st="5" end="5"/>
-                                            </p:txEl>
-                                          </p:spTgt>
-                                        </p:tgtEl>
-                                        <p:attrNameLst>
-                                          <p:attrName>style.visibility</p:attrName>
-                                        </p:attrNameLst>
-                                      </p:cBhvr>
-                                      <p:to>
-                                        <p:strVal val="visible"/>
-                                      </p:to>
-                                    </p:set>
-                                  </p:childTnLst>
-                                </p:cTn>
-                              </p:par>
-                            </p:childTnLst>
-                          </p:cTn>
-                        </p:par>
-                      </p:childTnLst>
-                    </p:cTn>
-                  </p:par>
-                  <p:par>
-                    <p:cTn id="19" fill="hold">
-                      <p:stCondLst>
-                        <p:cond delay="indefinite"/>
-                      </p:stCondLst>
-                      <p:childTnLst>
-                        <p:par>
-                          <p:cTn id="20" fill="hold">
-                            <p:stCondLst>
-                              <p:cond delay="0"/>
-                            </p:stCondLst>
-                            <p:childTnLst>
-                              <p:par>
-                                <p:cTn id="21" presetID="1" presetClass="entr" presetSubtype="0" fill="hold" nodeType="clickEffect">
-                                  <p:stCondLst>
-                                    <p:cond delay="0"/>
-                                  </p:stCondLst>
-                                  <p:childTnLst>
-                                    <p:set>
-                                      <p:cBhvr>
-                                        <p:cTn id="22" dur="1" fill="hold">
-                                          <p:stCondLst>
-                                            <p:cond delay="0"/>
-                                          </p:stCondLst>
-                                        </p:cTn>
-                                        <p:tgtEl>
-                                          <p:spTgt spid="3">
-                                            <p:txEl>
-                                              <p:pRg st="6" end="6"/>
-                                            </p:txEl>
-                                          </p:spTgt>
-                                        </p:tgtEl>
-                                        <p:attrNameLst>
-                                          <p:attrName>style.visibility</p:attrName>
-                                        </p:attrNameLst>
-                                      </p:cBhvr>
-                                      <p:to>
-                                        <p:strVal val="visible"/>
-                                      </p:to>
-                                    </p:set>
-                                  </p:childTnLst>
-                                </p:cTn>
-                              </p:par>
-                            </p:childTnLst>
-                          </p:cTn>
-                        </p:par>
-                      </p:childTnLst>
-                    </p:cTn>
-                  </p:par>
-                  <p:par>
-                    <p:cTn id="23" fill="hold">
-                      <p:stCondLst>
-                        <p:cond delay="indefinite"/>
-                      </p:stCondLst>
-                      <p:childTnLst>
-                        <p:par>
-                          <p:cTn id="24" fill="hold">
-                            <p:stCondLst>
-                              <p:cond delay="0"/>
-                            </p:stCondLst>
-                            <p:childTnLst>
-                              <p:par>
-                                <p:cTn id="25" presetID="1" presetClass="entr" presetSubtype="0" fill="hold" nodeType="clickEffect">
-                                  <p:stCondLst>
-                                    <p:cond delay="0"/>
-                                  </p:stCondLst>
-                                  <p:childTnLst>
-                                    <p:set>
-                                      <p:cBhvr>
-                                        <p:cTn id="26" dur="1" fill="hold">
-                                          <p:stCondLst>
-                                            <p:cond delay="0"/>
-                                          </p:stCondLst>
-                                        </p:cTn>
-                                        <p:tgtEl>
-                                          <p:spTgt spid="3">
-                                            <p:txEl>
-                                              <p:pRg st="7" end="7"/>
-                                            </p:txEl>
-                                          </p:spTgt>
-                                        </p:tgtEl>
-                                        <p:attrNameLst>
-                                          <p:attrName>style.visibility</p:attrName>
-                                        </p:attrNameLst>
-                                      </p:cBhvr>
-                                      <p:to>
-                                        <p:strVal val="visible"/>
-                                      </p:to>
-                                    </p:set>
-                                  </p:childTnLst>
-                                </p:cTn>
-                              </p:par>
-                            </p:childTnLst>
-                          </p:cTn>
-                        </p:par>
-                      </p:childTnLst>
-                    </p:cTn>
-                  </p:par>
-                  <p:par>
-                    <p:cTn id="27" fill="hold">
-                      <p:stCondLst>
-                        <p:cond delay="indefinite"/>
-                      </p:stCondLst>
-                      <p:childTnLst>
-                        <p:par>
-                          <p:cTn id="28" fill="hold">
-                            <p:stCondLst>
-                              <p:cond delay="0"/>
-                            </p:stCondLst>
-                            <p:childTnLst>
-                              <p:par>
-                                <p:cTn id="29" presetID="1" presetClass="entr" presetSubtype="0" fill="hold" nodeType="clickEffect">
-                                  <p:stCondLst>
-                                    <p:cond delay="0"/>
-                                  </p:stCondLst>
-                                  <p:childTnLst>
-                                    <p:set>
-                                      <p:cBhvr>
-                                        <p:cTn id="30" dur="1" fill="hold">
-                                          <p:stCondLst>
-                                            <p:cond delay="0"/>
-                                          </p:stCondLst>
-                                        </p:cTn>
-                                        <p:tgtEl>
-                                          <p:spTgt spid="3">
-                                            <p:txEl>
-                                              <p:pRg st="8" end="8"/>
-                                            </p:txEl>
-                                          </p:spTgt>
-                                        </p:tgtEl>
-                                        <p:attrNameLst>
-                                          <p:attrName>style.visibility</p:attrName>
-                                        </p:attrNameLst>
-                                      </p:cBhvr>
-                                      <p:to>
-                                        <p:strVal val="visible"/>
-                                      </p:to>
-                                    </p:set>
-                                  </p:childTnLst>
-                                </p:cTn>
-                              </p:par>
-                            </p:childTnLst>
-                          </p:cTn>
-                        </p:par>
-                      </p:childTnLst>
-                    </p:cTn>
-                  </p:par>
-                  <p:par>
-                    <p:cTn id="31" fill="hold">
-                      <p:stCondLst>
-                        <p:cond delay="indefinite"/>
-                      </p:stCondLst>
-                      <p:childTnLst>
-                        <p:par>
-                          <p:cTn id="32" fill="hold">
-                            <p:stCondLst>
-                              <p:cond delay="0"/>
-                            </p:stCondLst>
-                            <p:childTnLst>
-                              <p:par>
-                                <p:cTn id="33" presetID="1" presetClass="entr" presetSubtype="0" fill="hold" nodeType="clickEffect">
-                                  <p:stCondLst>
-                                    <p:cond delay="0"/>
-                                  </p:stCondLst>
-                                  <p:childTnLst>
-                                    <p:set>
-                                      <p:cBhvr>
-                                        <p:cTn id="34" dur="1" fill="hold">
-                                          <p:stCondLst>
-                                            <p:cond delay="0"/>
-                                          </p:stCondLst>
-                                        </p:cTn>
-                                        <p:tgtEl>
-                                          <p:spTgt spid="3">
-                                            <p:txEl>
-                                              <p:pRg st="9" end="9"/>
-                                            </p:txEl>
-                                          </p:spTgt>
-                                        </p:tgtEl>
-                                        <p:attrNameLst>
-                                          <p:attrName>style.visibility</p:attrName>
-                                        </p:attrNameLst>
-                                      </p:cBhvr>
-                                      <p:to>
-                                        <p:strVal val="visible"/>
-                                      </p:to>
-                                    </p:set>
-                                  </p:childTnLst>
-                                </p:cTn>
-                              </p:par>
-                            </p:childTnLst>
-                          </p:cTn>
-                        </p:par>
-                      </p:childTnLst>
-                    </p:cTn>
-                  </p:par>
-                  <p:par>
-                    <p:cTn id="35" fill="hold">
-                      <p:stCondLst>
-                        <p:cond delay="indefinite"/>
-                      </p:stCondLst>
-                      <p:childTnLst>
-                        <p:par>
-                          <p:cTn id="36" fill="hold">
-                            <p:stCondLst>
-                              <p:cond delay="0"/>
-                            </p:stCondLst>
-                            <p:childTnLst>
-                              <p:par>
-                                <p:cTn id="37" presetID="1" presetClass="entr" presetSubtype="0" fill="hold" nodeType="clickEffect">
-                                  <p:stCondLst>
-                                    <p:cond delay="0"/>
-                                  </p:stCondLst>
-                                  <p:childTnLst>
-                                    <p:set>
-                                      <p:cBhvr>
-                                        <p:cTn id="38" dur="1" fill="hold">
-                                          <p:stCondLst>
-                                            <p:cond delay="0"/>
-                                          </p:stCondLst>
-                                        </p:cTn>
-                                        <p:tgtEl>
-                                          <p:spTgt spid="3">
-                                            <p:txEl>
-                                              <p:pRg st="10" end="10"/>
-                                            </p:txEl>
-                                          </p:spTgt>
-                                        </p:tgtEl>
-                                        <p:attrNameLst>
-                                          <p:attrName>style.visibility</p:attrName>
-                                        </p:attrNameLst>
-                                      </p:cBhvr>
-                                      <p:to>
-                                        <p:strVal val="visible"/>
-                                      </p:to>
-                                    </p:set>
-                                  </p:childTnLst>
-                                </p:cTn>
-                              </p:par>
-                            </p:childTnLst>
-                          </p:cTn>
-                        </p:par>
-                      </p:childTnLst>
-                    </p:cTn>
-                  </p:par>
                 </p:childTnLst>
               </p:cTn>
               <p:prevCondLst>
@@ -4750,6 +4534,153 @@
       </p:grpSpPr>
       <p:sp>
         <p:nvSpPr>
+          <p:cNvPr id="2" name="Title 1">
+            <a:extLst>
+              <a:ext uri="{FF2B5EF4-FFF2-40B4-BE49-F238E27FC236}">
+                <a16:creationId xmlns:a16="http://schemas.microsoft.com/office/drawing/2014/main" id="{64CC6275-EB81-D24E-AF04-8F2D4F23DDB2}"/>
+              </a:ext>
+            </a:extLst>
+          </p:cNvPr>
+          <p:cNvSpPr>
+            <a:spLocks noGrp="1"/>
+          </p:cNvSpPr>
+          <p:nvPr>
+            <p:ph type="title"/>
+          </p:nvPr>
+        </p:nvSpPr>
+        <p:spPr>
+          <a:xfrm>
+            <a:off x="457200" y="152400"/>
+            <a:ext cx="8229600" cy="1143000"/>
+          </a:xfrm>
+        </p:spPr>
+        <p:txBody>
+          <a:bodyPr/>
+          <a:lstStyle/>
+          <a:p>
+            <a:r>
+              <a:rPr lang="en-US" dirty="0"/>
+              <a:t>Methods</a:t>
+            </a:r>
+          </a:p>
+        </p:txBody>
+      </p:sp>
+      <p:sp>
+        <p:nvSpPr>
+          <p:cNvPr id="3" name="Content Placeholder 2">
+            <a:extLst>
+              <a:ext uri="{FF2B5EF4-FFF2-40B4-BE49-F238E27FC236}">
+                <a16:creationId xmlns:a16="http://schemas.microsoft.com/office/drawing/2014/main" id="{38D7C4CB-2645-C44A-A095-11C1CC8BD3AE}"/>
+              </a:ext>
+            </a:extLst>
+          </p:cNvPr>
+          <p:cNvSpPr>
+            <a:spLocks noGrp="1"/>
+          </p:cNvSpPr>
+          <p:nvPr>
+            <p:ph idx="1"/>
+          </p:nvPr>
+        </p:nvSpPr>
+        <p:spPr>
+          <a:xfrm>
+            <a:off x="457200" y="1417638"/>
+            <a:ext cx="8229600" cy="5211762"/>
+          </a:xfrm>
+        </p:spPr>
+        <p:txBody>
+          <a:bodyPr>
+            <a:normAutofit fontScale="77500" lnSpcReduction="20000"/>
+          </a:bodyPr>
+          <a:lstStyle/>
+          <a:p>
+            <a:r>
+              <a:rPr lang="en-US" dirty="0"/>
+              <a:t>Must include: </a:t>
+            </a:r>
+          </a:p>
+          <a:p>
+            <a:pPr lvl="1"/>
+            <a:r>
+              <a:rPr lang="en-US" dirty="0"/>
+              <a:t>Which hypothesis you are testing with a given analysis</a:t>
+            </a:r>
+          </a:p>
+          <a:p>
+            <a:pPr lvl="1"/>
+            <a:r>
+              <a:rPr lang="en-US" dirty="0"/>
+              <a:t>Name &amp; citation of statistical software and any packages used for analysis or graphing. </a:t>
+            </a:r>
+          </a:p>
+          <a:p>
+            <a:pPr lvl="1"/>
+            <a:r>
+              <a:rPr lang="en-US" dirty="0"/>
+              <a:t>How data were summarized (mean, percent, etc.) and what you are using for measures of variability (e.g. SD, SE, 95% CI), if relevant</a:t>
+            </a:r>
+          </a:p>
+          <a:p>
+            <a:pPr lvl="1"/>
+            <a:r>
+              <a:rPr lang="en-US" dirty="0"/>
+              <a:t>Statistical tests, with associated data transformations, if relevant</a:t>
+            </a:r>
+          </a:p>
+          <a:p>
+            <a:pPr lvl="1"/>
+            <a:r>
+              <a:rPr lang="en-US" dirty="0"/>
+              <a:t>Assessment of model fit</a:t>
+            </a:r>
+          </a:p>
+          <a:p>
+            <a:pPr lvl="1"/>
+            <a:r>
+              <a:rPr lang="en-US" dirty="0"/>
+              <a:t>Method of inference (e.g. p-values from full model or reduced model with significance level, post-hoc tests, likelihood ratio test, model selection via AIC)</a:t>
+            </a:r>
+          </a:p>
+          <a:p>
+            <a:pPr lvl="1"/>
+            <a:r>
+              <a:rPr lang="en-US" dirty="0"/>
+              <a:t>Explanation of any aberrations from standard process (e.g. how you dealt with outliers, missing data, correlated predictors, etc.)</a:t>
+            </a:r>
+          </a:p>
+        </p:txBody>
+      </p:sp>
+    </p:spTree>
+    <p:extLst>
+      <p:ext uri="{BB962C8B-B14F-4D97-AF65-F5344CB8AC3E}">
+        <p14:creationId xmlns:p14="http://schemas.microsoft.com/office/powerpoint/2010/main" val="3511032707"/>
+      </p:ext>
+    </p:extLst>
+  </p:cSld>
+  <p:clrMapOvr>
+    <a:masterClrMapping/>
+  </p:clrMapOvr>
+</p:sld>
+</file>
+
+<file path=ppt/slides/slide5.xml><?xml version="1.0" encoding="utf-8"?>
+<p:sld xmlns:a="http://schemas.openxmlformats.org/drawingml/2006/main" xmlns:r="http://schemas.openxmlformats.org/officeDocument/2006/relationships" xmlns:p="http://schemas.openxmlformats.org/presentationml/2006/main">
+  <p:cSld>
+    <p:spTree>
+      <p:nvGrpSpPr>
+        <p:cNvPr id="1" name=""/>
+        <p:cNvGrpSpPr/>
+        <p:nvPr/>
+      </p:nvGrpSpPr>
+      <p:grpSpPr>
+        <a:xfrm>
+          <a:off x="0" y="0"/>
+          <a:ext cx="0" cy="0"/>
+          <a:chOff x="0" y="0"/>
+          <a:chExt cx="0" cy="0"/>
+        </a:xfrm>
+      </p:grpSpPr>
+      <p:sp>
+        <p:nvSpPr>
           <p:cNvPr id="4" name="Title 3"/>
           <p:cNvSpPr>
             <a:spLocks noGrp="1"/>
@@ -4851,7 +4782,7 @@
             </a:pPr>
             <a:r>
               <a:rPr lang="en-US" dirty="0"/>
-              <a:t>Identify predictors. Mention any standardizing that was done (if applicable)</a:t>
+              <a:t>Identify predictors, and any scaling/transformations (if applicable)</a:t>
             </a:r>
           </a:p>
           <a:p>
@@ -4923,7 +4854,7 @@
             </a:r>
             <a:r>
               <a:rPr lang="en-US" dirty="0" err="1"/>
-              <a:t>lsmeans</a:t>
+              <a:t>emmeans</a:t>
             </a:r>
             <a:r>
               <a:rPr lang="en-US" dirty="0"/>
@@ -5799,7 +5730,7 @@
 </p:sld>
 </file>
 
-<file path=ppt/slides/slide5.xml><?xml version="1.0" encoding="utf-8"?>
+<file path=ppt/slides/slide6.xml><?xml version="1.0" encoding="utf-8"?>
 <p:sld xmlns:a="http://schemas.openxmlformats.org/drawingml/2006/main" xmlns:r="http://schemas.openxmlformats.org/officeDocument/2006/relationships" xmlns:p="http://schemas.openxmlformats.org/presentationml/2006/main">
   <p:cSld>
     <p:spTree>
@@ -5877,118 +5808,6 @@
 </p:sld>
 </file>
 
-<file path=ppt/slides/slide6.xml><?xml version="1.0" encoding="utf-8"?>
-<p:sld xmlns:a="http://schemas.openxmlformats.org/drawingml/2006/main" xmlns:r="http://schemas.openxmlformats.org/officeDocument/2006/relationships" xmlns:p="http://schemas.openxmlformats.org/presentationml/2006/main">
-  <p:cSld>
-    <p:spTree>
-      <p:nvGrpSpPr>
-        <p:cNvPr id="1" name=""/>
-        <p:cNvGrpSpPr/>
-        <p:nvPr/>
-      </p:nvGrpSpPr>
-      <p:grpSpPr>
-        <a:xfrm>
-          <a:off x="0" y="0"/>
-          <a:ext cx="0" cy="0"/>
-          <a:chOff x="0" y="0"/>
-          <a:chExt cx="0" cy="0"/>
-        </a:xfrm>
-      </p:grpSpPr>
-      <p:sp>
-        <p:nvSpPr>
-          <p:cNvPr id="2" name="Title 1">
-            <a:extLst>
-              <a:ext uri="{FF2B5EF4-FFF2-40B4-BE49-F238E27FC236}">
-                <a16:creationId xmlns:a16="http://schemas.microsoft.com/office/drawing/2014/main" id="{5459EF77-9B2A-C246-8EBE-B3A9BFA8E5C1}"/>
-              </a:ext>
-            </a:extLst>
-          </p:cNvPr>
-          <p:cNvSpPr>
-            <a:spLocks noGrp="1"/>
-          </p:cNvSpPr>
-          <p:nvPr>
-            <p:ph type="title"/>
-          </p:nvPr>
-        </p:nvSpPr>
-        <p:spPr/>
-        <p:txBody>
-          <a:bodyPr>
-            <a:normAutofit fontScale="90000"/>
-          </a:bodyPr>
-          <a:lstStyle/>
-          <a:p>
-            <a:r>
-              <a:rPr lang="en-US" dirty="0"/>
-              <a:t>Methods: Multivariate statistical approach</a:t>
-            </a:r>
-          </a:p>
-        </p:txBody>
-      </p:sp>
-      <p:sp>
-        <p:nvSpPr>
-          <p:cNvPr id="3" name="Content Placeholder 2">
-            <a:extLst>
-              <a:ext uri="{FF2B5EF4-FFF2-40B4-BE49-F238E27FC236}">
-                <a16:creationId xmlns:a16="http://schemas.microsoft.com/office/drawing/2014/main" id="{7614D3EA-A2D7-6D4A-AE42-D8C09968BA29}"/>
-              </a:ext>
-            </a:extLst>
-          </p:cNvPr>
-          <p:cNvSpPr>
-            <a:spLocks noGrp="1"/>
-          </p:cNvSpPr>
-          <p:nvPr>
-            <p:ph idx="1"/>
-          </p:nvPr>
-        </p:nvSpPr>
-        <p:spPr/>
-        <p:txBody>
-          <a:bodyPr/>
-          <a:lstStyle/>
-          <a:p>
-            <a:r>
-              <a:rPr lang="en-US" dirty="0"/>
-              <a:t>Follow all general guidelines</a:t>
-            </a:r>
-          </a:p>
-          <a:p>
-            <a:pPr marL="0" indent="0">
-              <a:buNone/>
-            </a:pPr>
-            <a:r>
-              <a:rPr lang="en-US" dirty="0"/>
-              <a:t>And…</a:t>
-            </a:r>
-          </a:p>
-          <a:p>
-            <a:r>
-              <a:rPr lang="en-US" dirty="0"/>
-              <a:t>Clearly state methods used for visualization and statistical analysis. </a:t>
-            </a:r>
-          </a:p>
-          <a:p>
-            <a:r>
-              <a:rPr lang="en-US" dirty="0"/>
-              <a:t>Mention dissimilarity/distance index used, and reason it was chosen</a:t>
-            </a:r>
-          </a:p>
-          <a:p>
-            <a:endParaRPr lang="en-US" dirty="0"/>
-          </a:p>
-        </p:txBody>
-      </p:sp>
-    </p:spTree>
-    <p:extLst>
-      <p:ext uri="{BB962C8B-B14F-4D97-AF65-F5344CB8AC3E}">
-        <p14:creationId xmlns:p14="http://schemas.microsoft.com/office/powerpoint/2010/main" val="3174983316"/>
-      </p:ext>
-    </p:extLst>
-  </p:cSld>
-  <p:clrMapOvr>
-    <a:masterClrMapping/>
-  </p:clrMapOvr>
-</p:sld>
-</file>
-
 <file path=ppt/slides/slide7.xml><?xml version="1.0" encoding="utf-8"?>
 <p:sld xmlns:a="http://schemas.openxmlformats.org/drawingml/2006/main" xmlns:r="http://schemas.openxmlformats.org/officeDocument/2006/relationships" xmlns:p="http://schemas.openxmlformats.org/presentationml/2006/main">
   <p:cSld>
@@ -6011,7 +5830,7 @@
           <p:cNvPr id="2" name="Title 1">
             <a:extLst>
               <a:ext uri="{FF2B5EF4-FFF2-40B4-BE49-F238E27FC236}">
-                <a16:creationId xmlns:a16="http://schemas.microsoft.com/office/drawing/2014/main" id="{5D28F791-D8B9-5945-B212-6B5529EA4C4E}"/>
+                <a16:creationId xmlns:a16="http://schemas.microsoft.com/office/drawing/2014/main" id="{5459EF77-9B2A-C246-8EBE-B3A9BFA8E5C1}"/>
               </a:ext>
             </a:extLst>
           </p:cNvPr>
@@ -6024,12 +5843,14 @@
         </p:nvSpPr>
         <p:spPr/>
         <p:txBody>
-          <a:bodyPr/>
-          <a:lstStyle/>
-          <a:p>
-            <a:r>
-              <a:rPr lang="en-US" dirty="0"/>
-              <a:t>Results section</a:t>
+          <a:bodyPr>
+            <a:normAutofit fontScale="90000"/>
+          </a:bodyPr>
+          <a:lstStyle/>
+          <a:p>
+            <a:r>
+              <a:rPr lang="en-US" dirty="0"/>
+              <a:t>Methods: Multivariate statistical approach</a:t>
             </a:r>
           </a:p>
         </p:txBody>
@@ -6039,7 +5860,7 @@
           <p:cNvPr id="3" name="Content Placeholder 2">
             <a:extLst>
               <a:ext uri="{FF2B5EF4-FFF2-40B4-BE49-F238E27FC236}">
-                <a16:creationId xmlns:a16="http://schemas.microsoft.com/office/drawing/2014/main" id="{B88C478B-3FC4-D84E-88FE-B841E43AE2C9}"/>
+                <a16:creationId xmlns:a16="http://schemas.microsoft.com/office/drawing/2014/main" id="{7614D3EA-A2D7-6D4A-AE42-D8C09968BA29}"/>
               </a:ext>
             </a:extLst>
           </p:cNvPr>
@@ -6050,27 +5871,14 @@
             <p:ph idx="1"/>
           </p:nvPr>
         </p:nvSpPr>
-        <p:spPr>
-          <a:xfrm>
-            <a:off x="457200" y="1600200"/>
-            <a:ext cx="8229600" cy="4983162"/>
-          </a:xfrm>
-        </p:spPr>
-        <p:txBody>
-          <a:bodyPr>
-            <a:normAutofit fontScale="92500" lnSpcReduction="20000"/>
-          </a:bodyPr>
-          <a:lstStyle/>
-          <a:p>
-            <a:r>
-              <a:rPr lang="en-US" dirty="0"/>
-              <a:t>Choose only the necessary graphs, tables, and data for telling your story. </a:t>
-            </a:r>
-          </a:p>
-          <a:p>
-            <a:r>
-              <a:rPr lang="en-US" dirty="0"/>
-              <a:t>Craft a descriptive sentence or set of sentences that explain what you found, biologically. Keep the statistics to parentheses or tables. </a:t>
+        <p:spPr/>
+        <p:txBody>
+          <a:bodyPr/>
+          <a:lstStyle/>
+          <a:p>
+            <a:r>
+              <a:rPr lang="en-US" dirty="0"/>
+              <a:t>Follow all general guidelines</a:t>
             </a:r>
           </a:p>
           <a:p>
@@ -6078,60 +5886,31 @@
               <a:buNone/>
             </a:pPr>
             <a:r>
-              <a:rPr lang="en-US" sz="2400" dirty="0"/>
-              <a:t>	“By day 8, cowbirds reared with host young were, on average, 	14% heavier than cowbirds reared alone (unpaired t</a:t>
-            </a:r>
-            <a:r>
-              <a:rPr lang="en-US" sz="2400" baseline="-25000" dirty="0"/>
-              <a:t>16</a:t>
-            </a:r>
-            <a:r>
-              <a:rPr lang="en-US" sz="2400" dirty="0"/>
-              <a:t> = −2.23, 	P = 0.041, Fig. 2A).”(</a:t>
-            </a:r>
-            <a:r>
-              <a:rPr lang="en-US" sz="2400" dirty="0" err="1"/>
-              <a:t>Kilner</a:t>
-            </a:r>
-            <a:r>
-              <a:rPr lang="en-US" sz="2400" dirty="0"/>
-              <a:t> et al. </a:t>
-            </a:r>
-            <a:r>
-              <a:rPr lang="en-US" sz="2400" dirty="0">
-                <a:hlinkClick r:id="rId2"/>
-              </a:rPr>
-              <a:t>2004</a:t>
-            </a:r>
-            <a:r>
-              <a:rPr lang="en-US" sz="2400" dirty="0"/>
-              <a:t>)</a:t>
-            </a:r>
-          </a:p>
-          <a:p>
-            <a:pPr marL="0" indent="0">
-              <a:buNone/>
-            </a:pPr>
+              <a:rPr lang="en-US" dirty="0"/>
+              <a:t>And…</a:t>
+            </a:r>
+          </a:p>
+          <a:p>
+            <a:r>
+              <a:rPr lang="en-US" dirty="0"/>
+              <a:t>Clearly state methods used for visualization and statistical analysis. </a:t>
+            </a:r>
+          </a:p>
+          <a:p>
+            <a:r>
+              <a:rPr lang="en-US" dirty="0"/>
+              <a:t>Mention dissimilarity/distance index used, and reason it was chosen</a:t>
+            </a:r>
+          </a:p>
+          <a:p>
             <a:endParaRPr lang="en-US" dirty="0"/>
-          </a:p>
-          <a:p>
-            <a:r>
-              <a:rPr lang="en-US" dirty="0"/>
-              <a:t>Use subsections if there are multiple parts</a:t>
-            </a:r>
-          </a:p>
-          <a:p>
-            <a:r>
-              <a:rPr lang="en-US" dirty="0"/>
-              <a:t>If you want to discuss data in the discussion, you must present it in the results. </a:t>
-            </a:r>
           </a:p>
         </p:txBody>
       </p:sp>
     </p:spTree>
     <p:extLst>
       <p:ext uri="{BB962C8B-B14F-4D97-AF65-F5344CB8AC3E}">
-        <p14:creationId xmlns:p14="http://schemas.microsoft.com/office/powerpoint/2010/main" val="1640210840"/>
+        <p14:creationId xmlns:p14="http://schemas.microsoft.com/office/powerpoint/2010/main" val="3174983316"/>
       </p:ext>
     </p:extLst>
   </p:cSld>
@@ -6160,7 +5939,41 @@
       </p:grpSpPr>
       <p:sp>
         <p:nvSpPr>
-          <p:cNvPr id="3" name="Content Placeholder 2"/>
+          <p:cNvPr id="2" name="Title 1">
+            <a:extLst>
+              <a:ext uri="{FF2B5EF4-FFF2-40B4-BE49-F238E27FC236}">
+                <a16:creationId xmlns:a16="http://schemas.microsoft.com/office/drawing/2014/main" id="{5D28F791-D8B9-5945-B212-6B5529EA4C4E}"/>
+              </a:ext>
+            </a:extLst>
+          </p:cNvPr>
+          <p:cNvSpPr>
+            <a:spLocks noGrp="1"/>
+          </p:cNvSpPr>
+          <p:nvPr>
+            <p:ph type="title"/>
+          </p:nvPr>
+        </p:nvSpPr>
+        <p:spPr/>
+        <p:txBody>
+          <a:bodyPr/>
+          <a:lstStyle/>
+          <a:p>
+            <a:r>
+              <a:rPr lang="en-US" dirty="0"/>
+              <a:t>Results section</a:t>
+            </a:r>
+          </a:p>
+        </p:txBody>
+      </p:sp>
+      <p:sp>
+        <p:nvSpPr>
+          <p:cNvPr id="3" name="Content Placeholder 2">
+            <a:extLst>
+              <a:ext uri="{FF2B5EF4-FFF2-40B4-BE49-F238E27FC236}">
+                <a16:creationId xmlns:a16="http://schemas.microsoft.com/office/drawing/2014/main" id="{B88C478B-3FC4-D84E-88FE-B841E43AE2C9}"/>
+              </a:ext>
+            </a:extLst>
+          </p:cNvPr>
           <p:cNvSpPr>
             <a:spLocks noGrp="1"/>
           </p:cNvSpPr>
@@ -6170,85 +5983,88 @@
         </p:nvSpPr>
         <p:spPr>
           <a:xfrm>
-            <a:off x="457200" y="1295400"/>
-            <a:ext cx="8229600" cy="5287963"/>
+            <a:off x="457200" y="1600200"/>
+            <a:ext cx="8229600" cy="4983162"/>
           </a:xfrm>
         </p:spPr>
         <p:txBody>
           <a:bodyPr>
-            <a:normAutofit/>
+            <a:normAutofit fontScale="92500" lnSpcReduction="20000"/>
           </a:bodyPr>
           <a:lstStyle/>
           <a:p>
             <a:r>
               <a:rPr lang="en-US" dirty="0"/>
-              <a:t>Mention how you got to final model.</a:t>
-            </a:r>
-          </a:p>
-          <a:p>
-            <a:pPr lvl="1"/>
-            <a:r>
-              <a:rPr lang="en-US" dirty="0"/>
-              <a:t>E.g. ‘using model selection, we …’</a:t>
-            </a:r>
-          </a:p>
-          <a:p>
-            <a:r>
-              <a:rPr lang="en-US" dirty="0"/>
-              <a:t>Report assessment of model adequacy (e.g. R</a:t>
-            </a:r>
-            <a:r>
-              <a:rPr lang="en-US" baseline="30000" dirty="0"/>
-              <a:t>2</a:t>
-            </a:r>
-            <a:r>
-              <a:rPr lang="en-US" dirty="0"/>
-              <a:t> from predicted/observed; proportion of deviance explained)</a:t>
-            </a:r>
-          </a:p>
-          <a:p>
-            <a:pPr lvl="1"/>
+              <a:t>Choose only the necessary graphs, tables, and data for telling your story. </a:t>
+            </a:r>
+          </a:p>
+          <a:p>
+            <a:r>
+              <a:rPr lang="en-US" dirty="0"/>
+              <a:t>Craft a descriptive sentence or set of sentences that explain what you found, biologically. Keep the statistics to parentheses or tables. </a:t>
+            </a:r>
+          </a:p>
+          <a:p>
+            <a:pPr marL="0" indent="0">
+              <a:buNone/>
+            </a:pPr>
+            <a:r>
+              <a:rPr lang="en-US" sz="2400" dirty="0"/>
+              <a:t>	“By day 8, cowbirds reared with host young were, on average, 	14% heavier than cowbirds reared alone (unpaired t</a:t>
+            </a:r>
+            <a:r>
+              <a:rPr lang="en-US" sz="2400" baseline="-25000" dirty="0"/>
+              <a:t>16</a:t>
+            </a:r>
+            <a:r>
+              <a:rPr lang="en-US" sz="2400" dirty="0"/>
+              <a:t> = −2.23, 	P = 0.041, Fig. 2A).”(</a:t>
+            </a:r>
+            <a:r>
+              <a:rPr lang="en-US" sz="2400" dirty="0" err="1"/>
+              <a:t>Kilner</a:t>
+            </a:r>
+            <a:r>
+              <a:rPr lang="en-US" sz="2400" dirty="0"/>
+              <a:t> et al. </a:t>
+            </a:r>
+            <a:r>
+              <a:rPr lang="en-US" sz="2400" dirty="0">
+                <a:hlinkClick r:id="rId2"/>
+              </a:rPr>
+              <a:t>2004</a:t>
+            </a:r>
+            <a:r>
+              <a:rPr lang="en-US" sz="2400" dirty="0"/>
+              <a:t>)</a:t>
+            </a:r>
+          </a:p>
+          <a:p>
+            <a:pPr marL="0" indent="0">
+              <a:buNone/>
+            </a:pPr>
             <a:endParaRPr lang="en-US" dirty="0"/>
           </a:p>
           <a:p>
-            <a:pPr lvl="1"/>
-            <a:endParaRPr lang="en-US" dirty="0"/>
-          </a:p>
-          <a:p>
-            <a:endParaRPr lang="en-US" dirty="0"/>
-          </a:p>
-        </p:txBody>
-      </p:sp>
-      <p:sp>
-        <p:nvSpPr>
-          <p:cNvPr id="4" name="Title 3"/>
-          <p:cNvSpPr>
-            <a:spLocks noGrp="1"/>
-          </p:cNvSpPr>
-          <p:nvPr>
-            <p:ph type="title"/>
-          </p:nvPr>
-        </p:nvSpPr>
-        <p:spPr>
-          <a:xfrm>
-            <a:off x="457200" y="0"/>
-            <a:ext cx="8229600" cy="1143000"/>
-          </a:xfrm>
-        </p:spPr>
-        <p:txBody>
-          <a:bodyPr>
-            <a:normAutofit/>
-          </a:bodyPr>
-          <a:lstStyle/>
-          <a:p>
-            <a:r>
-              <a:rPr lang="en-US" dirty="0"/>
-              <a:t>Results- in text</a:t>
+            <a:r>
+              <a:rPr lang="en-US" dirty="0"/>
+              <a:t>Use subsections if there are multiple parts</a:t>
+            </a:r>
+          </a:p>
+          <a:p>
+            <a:r>
+              <a:rPr lang="en-US" dirty="0"/>
+              <a:t>If you want to discuss data in the discussion, you must present it in the results. </a:t>
             </a:r>
           </a:p>
         </p:txBody>
       </p:sp>
     </p:spTree>
+    <p:extLst>
+      <p:ext uri="{BB962C8B-B14F-4D97-AF65-F5344CB8AC3E}">
+        <p14:creationId xmlns:p14="http://schemas.microsoft.com/office/powerpoint/2010/main" val="1640210840"/>
+      </p:ext>
+    </p:extLst>
   </p:cSld>
   <p:clrMapOvr>
     <a:masterClrMapping/>
@@ -6283,7 +6099,12 @@
             <p:ph idx="1"/>
           </p:nvPr>
         </p:nvSpPr>
-        <p:spPr/>
+        <p:spPr>
+          <a:xfrm>
+            <a:off x="457200" y="1295400"/>
+            <a:ext cx="8229600" cy="5287963"/>
+          </a:xfrm>
+        </p:spPr>
         <p:txBody>
           <a:bodyPr>
             <a:normAutofit/>
@@ -6292,72 +6113,67 @@
           <a:p>
             <a:r>
               <a:rPr lang="en-US" dirty="0"/>
-              <a:t>Describe relationships between variables in best fitting model (e.g. as x increased, y decreased);  Should only do this with significant variables. </a:t>
-            </a:r>
-          </a:p>
-          <a:p>
-            <a:r>
-              <a:rPr lang="en-US" dirty="0"/>
-              <a:t>Present estimated mean (coefficient from model) and standard error from optimal model</a:t>
-            </a:r>
+              <a:t>Mention how you got to final model.</a:t>
+            </a:r>
+          </a:p>
+          <a:p>
+            <a:pPr lvl="1"/>
+            <a:r>
+              <a:rPr lang="en-US" dirty="0"/>
+              <a:t>E.g. ‘using model selection, we …’</a:t>
+            </a:r>
+          </a:p>
+          <a:p>
+            <a:r>
+              <a:rPr lang="en-US" dirty="0"/>
+              <a:t>Report assessment of model adequacy (e.g. R</a:t>
+            </a:r>
+            <a:r>
+              <a:rPr lang="en-US" baseline="30000" dirty="0"/>
+              <a:t>2</a:t>
+            </a:r>
+            <a:r>
+              <a:rPr lang="en-US" dirty="0"/>
+              <a:t> from predicted/observed; proportion of deviance explained)</a:t>
+            </a:r>
+          </a:p>
+          <a:p>
+            <a:pPr lvl="1"/>
+            <a:endParaRPr lang="en-US" dirty="0"/>
+          </a:p>
+          <a:p>
+            <a:pPr lvl="1"/>
+            <a:endParaRPr lang="en-US" dirty="0"/>
+          </a:p>
+          <a:p>
+            <a:endParaRPr lang="en-US" dirty="0"/>
           </a:p>
         </p:txBody>
       </p:sp>
       <p:sp>
         <p:nvSpPr>
           <p:cNvPr id="4" name="Title 3"/>
-          <p:cNvSpPr txBox="1">
-            <a:spLocks/>
-          </p:cNvSpPr>
-          <p:nvPr/>
+          <p:cNvSpPr>
+            <a:spLocks noGrp="1"/>
+          </p:cNvSpPr>
+          <p:nvPr>
+            <p:ph type="title"/>
+          </p:nvPr>
         </p:nvSpPr>
         <p:spPr>
           <a:xfrm>
-            <a:off x="457200" y="304800"/>
+            <a:off x="457200" y="0"/>
             <a:ext cx="8229600" cy="1143000"/>
           </a:xfrm>
-          <a:prstGeom prst="rect">
-            <a:avLst/>
-          </a:prstGeom>
         </p:spPr>
         <p:txBody>
-          <a:bodyPr vert="horz" lIns="91440" tIns="45720" rIns="91440" bIns="45720" rtlCol="0" anchor="ctr">
+          <a:bodyPr>
             <a:normAutofit/>
           </a:bodyPr>
           <a:lstStyle/>
           <a:p>
-            <a:pPr marL="0" marR="0" lvl="0" indent="0" algn="ctr" defTabSz="914400" rtl="0" eaLnBrk="1" fontAlgn="auto" latinLnBrk="0" hangingPunct="1">
-              <a:lnSpc>
-                <a:spcPct val="100000"/>
-              </a:lnSpc>
-              <a:spcBef>
-                <a:spcPct val="0"/>
-              </a:spcBef>
-              <a:spcAft>
-                <a:spcPts val="0"/>
-              </a:spcAft>
-              <a:buClrTx/>
-              <a:buSzTx/>
-              <a:buFontTx/>
-              <a:buNone/>
-              <a:tabLst/>
-              <a:defRPr/>
-            </a:pPr>
-            <a:r>
-              <a:rPr kumimoji="0" lang="en-US" sz="4400" b="0" i="0" u="none" strike="noStrike" kern="1200" cap="none" spc="0" normalizeH="0" baseline="0" noProof="0" dirty="0">
-                <a:ln>
-                  <a:noFill/>
-                </a:ln>
-                <a:solidFill>
-                  <a:schemeClr val="tx1"/>
-                </a:solidFill>
-                <a:effectLst/>
-                <a:uLnTx/>
-                <a:uFillTx/>
-                <a:latin typeface="+mj-lt"/>
-                <a:ea typeface="+mj-ea"/>
-                <a:cs typeface="+mj-cs"/>
-              </a:rPr>
+            <a:r>
+              <a:rPr lang="en-US" dirty="0"/>
               <a:t>Results- in text</a:t>
             </a:r>
           </a:p>

</xml_diff>